<commit_message>
updated PPTX for presentation
</commit_message>
<xml_diff>
--- a/Roscoe_Credit_Union/Roscoe Credit Union.pptx
+++ b/Roscoe_Credit_Union/Roscoe Credit Union.pptx
@@ -40369,7 +40369,7 @@
         </p:spPr>
         <p:txBody>
           <a:bodyPr>
-            <a:normAutofit/>
+            <a:normAutofit lnSpcReduction="10000"/>
           </a:bodyPr>
           <a:lstStyle/>
           <a:p>
@@ -40380,7 +40380,23 @@
             </a:pPr>
             <a:r>
               <a:rPr lang="en-US" dirty="0"/>
-              <a:t>Roscoe Credit Union was design as a database application that would be able to manipulate and populate the Credit Union Database, to allow the users to interact with this application like a normal bank. There are Customer Accounts, Teller Accounts and Manager Accounts, which all play a different role.</a:t>
+              <a:t>Roscoe Credit Union was design as a database application that would be able to manipulate and populate the Credit Union Database, and to allow the users to interact with this application like a normal bank and make </a:t>
+            </a:r>
+            <a:r>
+              <a:rPr lang="en-US"/>
+              <a:t>bank transfers.</a:t>
+            </a:r>
+            <a:endParaRPr lang="en-US" dirty="0"/>
+          </a:p>
+          <a:p>
+            <a:pPr>
+              <a:spcAft>
+                <a:spcPts val="600"/>
+              </a:spcAft>
+            </a:pPr>
+            <a:r>
+              <a:rPr lang="en-US" dirty="0"/>
+              <a:t>There are Customer Accounts, Teller Accounts and Manager Accounts, which all play a different role.</a:t>
             </a:r>
             <a:br>
               <a:rPr lang="en-US" dirty="0"/>
@@ -40397,88 +40413,6 @@
               </a:spcAft>
             </a:pPr>
             <a:endParaRPr lang="en-US" dirty="0"/>
-          </a:p>
-        </p:txBody>
-      </p:sp>
-      <p:sp>
-        <p:nvSpPr>
-          <p:cNvPr id="2" name="Date Placeholder 1">
-            <a:extLst>
-              <a:ext uri="{FF2B5EF4-FFF2-40B4-BE49-F238E27FC236}">
-                <a16:creationId xmlns:a16="http://schemas.microsoft.com/office/drawing/2014/main" id="{DA884D8B-635B-7402-1437-04A104C24B54}"/>
-              </a:ext>
-            </a:extLst>
-          </p:cNvPr>
-          <p:cNvSpPr>
-            <a:spLocks noGrp="1"/>
-          </p:cNvSpPr>
-          <p:nvPr>
-            <p:ph type="dt" sz="half" idx="10"/>
-          </p:nvPr>
-        </p:nvSpPr>
-        <p:spPr>
-          <a:xfrm>
-            <a:off x="365760" y="6464808"/>
-            <a:ext cx="987552" cy="310896"/>
-          </a:xfrm>
-        </p:spPr>
-        <p:txBody>
-          <a:bodyPr anchor="ctr">
-            <a:normAutofit/>
-          </a:bodyPr>
-          <a:lstStyle/>
-          <a:p>
-            <a:pPr>
-              <a:spcAft>
-                <a:spcPts val="600"/>
-              </a:spcAft>
-            </a:pPr>
-            <a:r>
-              <a:rPr lang="en-US" dirty="0"/>
-              <a:t>20XX</a:t>
-            </a:r>
-            <a:endParaRPr lang="en-US"/>
-          </a:p>
-        </p:txBody>
-      </p:sp>
-      <p:sp>
-        <p:nvSpPr>
-          <p:cNvPr id="3" name="Footer Placeholder 2">
-            <a:extLst>
-              <a:ext uri="{FF2B5EF4-FFF2-40B4-BE49-F238E27FC236}">
-                <a16:creationId xmlns:a16="http://schemas.microsoft.com/office/drawing/2014/main" id="{FAD9BE9C-B5EA-5DA0-9156-6E05D3882992}"/>
-              </a:ext>
-            </a:extLst>
-          </p:cNvPr>
-          <p:cNvSpPr>
-            <a:spLocks noGrp="1"/>
-          </p:cNvSpPr>
-          <p:nvPr>
-            <p:ph type="ftr" sz="quarter" idx="11"/>
-          </p:nvPr>
-        </p:nvSpPr>
-        <p:spPr>
-          <a:xfrm>
-            <a:off x="4379976" y="6464808"/>
-            <a:ext cx="3438144" cy="310896"/>
-          </a:xfrm>
-        </p:spPr>
-        <p:txBody>
-          <a:bodyPr anchor="ctr">
-            <a:normAutofit/>
-          </a:bodyPr>
-          <a:lstStyle/>
-          <a:p>
-            <a:pPr>
-              <a:spcAft>
-                <a:spcPts val="600"/>
-              </a:spcAft>
-            </a:pPr>
-            <a:r>
-              <a:rPr lang="en-US" dirty="0"/>
-              <a:t>presentation title</a:t>
-            </a:r>
-            <a:endParaRPr lang="en-US"/>
           </a:p>
         </p:txBody>
       </p:sp>
@@ -40892,64 +40826,6 @@
       </p:sp>
       <p:sp>
         <p:nvSpPr>
-          <p:cNvPr id="4" name="Date Placeholder 3">
-            <a:extLst>
-              <a:ext uri="{FF2B5EF4-FFF2-40B4-BE49-F238E27FC236}">
-                <a16:creationId xmlns:a16="http://schemas.microsoft.com/office/drawing/2014/main" id="{20DE831C-087D-8B22-28A5-5DF5361EB313}"/>
-              </a:ext>
-            </a:extLst>
-          </p:cNvPr>
-          <p:cNvSpPr>
-            <a:spLocks noGrp="1"/>
-          </p:cNvSpPr>
-          <p:nvPr>
-            <p:ph type="dt" sz="half" idx="10"/>
-          </p:nvPr>
-        </p:nvSpPr>
-        <p:spPr/>
-        <p:txBody>
-          <a:bodyPr/>
-          <a:lstStyle/>
-          <a:p>
-            <a:r>
-              <a:rPr lang="en-US"/>
-              <a:t>20XX</a:t>
-            </a:r>
-            <a:endParaRPr lang="en-US" dirty="0"/>
-          </a:p>
-        </p:txBody>
-      </p:sp>
-      <p:sp>
-        <p:nvSpPr>
-          <p:cNvPr id="5" name="Footer Placeholder 4">
-            <a:extLst>
-              <a:ext uri="{FF2B5EF4-FFF2-40B4-BE49-F238E27FC236}">
-                <a16:creationId xmlns:a16="http://schemas.microsoft.com/office/drawing/2014/main" id="{19B756E1-B9B5-8848-5463-BC8CE34684D5}"/>
-              </a:ext>
-            </a:extLst>
-          </p:cNvPr>
-          <p:cNvSpPr>
-            <a:spLocks noGrp="1"/>
-          </p:cNvSpPr>
-          <p:nvPr>
-            <p:ph type="ftr" sz="quarter" idx="11"/>
-          </p:nvPr>
-        </p:nvSpPr>
-        <p:spPr/>
-        <p:txBody>
-          <a:bodyPr/>
-          <a:lstStyle/>
-          <a:p>
-            <a:r>
-              <a:rPr lang="en-US"/>
-              <a:t>presentation title</a:t>
-            </a:r>
-            <a:endParaRPr lang="en-US" dirty="0"/>
-          </a:p>
-        </p:txBody>
-      </p:sp>
-      <p:sp>
-        <p:nvSpPr>
           <p:cNvPr id="6" name="Slide Number Placeholder 5">
             <a:extLst>
               <a:ext uri="{FF2B5EF4-FFF2-40B4-BE49-F238E27FC236}">
@@ -41199,62 +41075,6 @@
       </p:sp>
       <p:sp>
         <p:nvSpPr>
-          <p:cNvPr id="4" name="Date Placeholder 3">
-            <a:extLst>
-              <a:ext uri="{FF2B5EF4-FFF2-40B4-BE49-F238E27FC236}">
-                <a16:creationId xmlns:a16="http://schemas.microsoft.com/office/drawing/2014/main" id="{D74CC35A-169D-2E87-6515-5E6B9D8F47EF}"/>
-              </a:ext>
-            </a:extLst>
-          </p:cNvPr>
-          <p:cNvSpPr>
-            <a:spLocks noGrp="1"/>
-          </p:cNvSpPr>
-          <p:nvPr>
-            <p:ph type="dt" sz="half" idx="10"/>
-          </p:nvPr>
-        </p:nvSpPr>
-        <p:spPr/>
-        <p:txBody>
-          <a:bodyPr/>
-          <a:lstStyle/>
-          <a:p>
-            <a:r>
-              <a:rPr lang="en-US" dirty="0"/>
-              <a:t>20XX</a:t>
-            </a:r>
-          </a:p>
-        </p:txBody>
-      </p:sp>
-      <p:sp>
-        <p:nvSpPr>
-          <p:cNvPr id="6" name="Footer Placeholder 5">
-            <a:extLst>
-              <a:ext uri="{FF2B5EF4-FFF2-40B4-BE49-F238E27FC236}">
-                <a16:creationId xmlns:a16="http://schemas.microsoft.com/office/drawing/2014/main" id="{8F9C73CF-CD73-39D0-D208-17D75BEB817B}"/>
-              </a:ext>
-            </a:extLst>
-          </p:cNvPr>
-          <p:cNvSpPr>
-            <a:spLocks noGrp="1"/>
-          </p:cNvSpPr>
-          <p:nvPr>
-            <p:ph type="ftr" sz="quarter" idx="11"/>
-          </p:nvPr>
-        </p:nvSpPr>
-        <p:spPr/>
-        <p:txBody>
-          <a:bodyPr/>
-          <a:lstStyle/>
-          <a:p>
-            <a:r>
-              <a:rPr lang="en-US" dirty="0"/>
-              <a:t>presentation title</a:t>
-            </a:r>
-          </a:p>
-        </p:txBody>
-      </p:sp>
-      <p:sp>
-        <p:nvSpPr>
           <p:cNvPr id="8" name="Slide Number Placeholder 7">
             <a:extLst>
               <a:ext uri="{FF2B5EF4-FFF2-40B4-BE49-F238E27FC236}">
@@ -41300,7 +41120,9 @@
         </p:nvSpPr>
         <p:spPr/>
         <p:txBody>
-          <a:bodyPr/>
+          <a:bodyPr>
+            <a:normAutofit fontScale="92500" lnSpcReduction="10000"/>
+          </a:bodyPr>
           <a:lstStyle/>
           <a:p>
             <a:r>
@@ -41311,13 +41133,19 @@
           <a:p>
             <a:r>
               <a:rPr lang="en-US" dirty="0"/>
-              <a:t>For the design, we went with high fidelity for the customer view, but low and clunky views for the Manager and Teller as they are more likely trained on the software.</a:t>
+              <a:t>For the design, we went with high fidelity for the customer view, but low and clunky views for the Manager and Teller as they are more likely trained on the software, and we need more time to add more features to the Tellers and Managers.</a:t>
             </a:r>
           </a:p>
           <a:p>
             <a:r>
               <a:rPr lang="en-US" dirty="0"/>
               <a:t>Security is an issue as we don’t believe our code protects against database attacks at all from a customer, as well as having public methods that could be reached in the customer view.</a:t>
+            </a:r>
+          </a:p>
+          <a:p>
+            <a:r>
+              <a:rPr lang="en-US" dirty="0"/>
+              <a:t>Usernames and Passwords are not Hashed, they are stored directly and therefore pose as a security risk.</a:t>
             </a:r>
           </a:p>
         </p:txBody>
@@ -42233,6 +42061,15 @@
 </file>
 
 <file path=customXml/item1.xml><?xml version="1.0" encoding="utf-8"?>
+<?mso-contentType ?>
+<FormTemplates xmlns="http://schemas.microsoft.com/sharepoint/v3/contenttype/forms">
+  <Display>DocumentLibraryForm</Display>
+  <Edit>DocumentLibraryForm</Edit>
+  <New>DocumentLibraryForm</New>
+</FormTemplates>
+</file>
+
+<file path=customXml/item2.xml><?xml version="1.0" encoding="utf-8"?>
 <ct:contentTypeSchema xmlns:ct="http://schemas.microsoft.com/office/2006/metadata/contentType" xmlns:ma="http://schemas.microsoft.com/office/2006/metadata/properties/metaAttributes" ct:_="" ma:_="" ma:contentTypeName="Document" ma:contentTypeID="0x01010079F111ED35F8CC479449609E8A0923A6" ma:contentTypeVersion="28" ma:contentTypeDescription="Create a new document." ma:contentTypeScope="" ma:versionID="60f5a4f2d2b0abadcf532d48ebf9cb71">
   <xsd:schema xmlns:xsd="http://www.w3.org/2001/XMLSchema" xmlns:xs="http://www.w3.org/2001/XMLSchema" xmlns:p="http://schemas.microsoft.com/office/2006/metadata/properties" xmlns:ns1="http://schemas.microsoft.com/sharepoint/v3" xmlns:ns2="71af3243-3dd4-4a8d-8c0d-dd76da1f02a5" xmlns:ns3="16c05727-aa75-4e4a-9b5f-8a80a1165891" xmlns:ns4="230e9df3-be65-4c73-a93b-d1236ebd677e" targetNamespace="http://schemas.microsoft.com/office/2006/metadata/properties" ma:root="true" ma:fieldsID="7dd78129e6a1811f84807ad11c651531" ns1:_="" ns2:_="" ns3:_="" ns4:_="">
     <xsd:import namespace="http://schemas.microsoft.com/sharepoint/v3"/>
@@ -42544,15 +42381,6 @@
 </ct:contentTypeSchema>
 </file>
 
-<file path=customXml/item2.xml><?xml version="1.0" encoding="utf-8"?>
-<?mso-contentType ?>
-<FormTemplates xmlns="http://schemas.microsoft.com/sharepoint/v3/contenttype/forms">
-  <Display>DocumentLibraryForm</Display>
-  <Edit>DocumentLibraryForm</Edit>
-  <New>DocumentLibraryForm</New>
-</FormTemplates>
-</file>
-
 <file path=customXml/item3.xml><?xml version="1.0" encoding="utf-8"?>
 <p:properties xmlns:p="http://schemas.microsoft.com/office/2006/metadata/properties" xmlns:xsi="http://www.w3.org/2001/XMLSchema-instance" xmlns:pc="http://schemas.microsoft.com/office/infopath/2007/PartnerControls">
   <documentManagement>
@@ -42574,6 +42402,14 @@
 </file>
 
 <file path=customXml/itemProps1.xml><?xml version="1.0" encoding="utf-8"?>
+<ds:datastoreItem xmlns:ds="http://schemas.openxmlformats.org/officeDocument/2006/customXml" ds:itemID="{1EE26AC2-BC04-45BA-BD7C-5CDF09AA9426}">
+  <ds:schemaRefs>
+    <ds:schemaRef ds:uri="http://schemas.microsoft.com/sharepoint/v3/contenttype/forms"/>
+  </ds:schemaRefs>
+</ds:datastoreItem>
+</file>
+
+<file path=customXml/itemProps2.xml><?xml version="1.0" encoding="utf-8"?>
 <ds:datastoreItem xmlns:ds="http://schemas.openxmlformats.org/officeDocument/2006/customXml" ds:itemID="{18840F3C-8AB4-4243-A06A-B5999EF60028}">
   <ds:schemaRefs>
     <ds:schemaRef ds:uri="http://schemas.microsoft.com/office/2006/metadata/contentType"/>
@@ -42594,14 +42430,6 @@
 </ds:datastoreItem>
 </file>
 
-<file path=customXml/itemProps2.xml><?xml version="1.0" encoding="utf-8"?>
-<ds:datastoreItem xmlns:ds="http://schemas.openxmlformats.org/officeDocument/2006/customXml" ds:itemID="{1EE26AC2-BC04-45BA-BD7C-5CDF09AA9426}">
-  <ds:schemaRefs>
-    <ds:schemaRef ds:uri="http://schemas.microsoft.com/sharepoint/v3/contenttype/forms"/>
-  </ds:schemaRefs>
-</ds:datastoreItem>
-</file>
-
 <file path=customXml/itemProps3.xml><?xml version="1.0" encoding="utf-8"?>
 <ds:datastoreItem xmlns:ds="http://schemas.openxmlformats.org/officeDocument/2006/customXml" ds:itemID="{C7AE7813-FB42-416C-BEF8-5F3180DDB0F6}">
   <ds:schemaRefs>

</xml_diff>